<commit_message>
Nova versão final do relatório e apresentação final
</commit_message>
<xml_diff>
--- a/doc/Apresentação Oral/AFinal_v4.pptx
+++ b/doc/Apresentação Oral/AFinal_v4.pptx
@@ -2238,29 +2238,29 @@
     </dgm:pt>
   </dgm:ptLst>
   <dgm:cxnLst>
-    <dgm:cxn modelId="{F7E4C5EA-DFF3-4CA5-B13C-89A73E0450D9}" type="presOf" srcId="{903E13AB-7FF9-4EF1-9CC8-42D43D9E5AF2}" destId="{005977C5-7746-4332-AB63-5565C2615FED}" srcOrd="1" destOrd="0" presId="urn:microsoft.com/office/officeart/2005/8/layout/process1"/>
-    <dgm:cxn modelId="{F106EA50-CE0A-49EA-9830-F23364F8072D}" srcId="{BA80B3D6-D686-4335-B8FE-A5B174A91D1F}" destId="{CCE039CF-CC13-4D3D-851B-AB1839045A98}" srcOrd="1" destOrd="0" parTransId="{F7538E36-531A-4ABF-83F2-4D674DEF8E32}" sibTransId="{0827E205-FFF6-4C97-99DA-E7CCB976213E}"/>
-    <dgm:cxn modelId="{72341014-660C-4F4B-99DB-6D5B90535813}" type="presOf" srcId="{BA80B3D6-D686-4335-B8FE-A5B174A91D1F}" destId="{52A5986A-80EF-452F-B163-4F651F6E920E}" srcOrd="0" destOrd="0" presId="urn:microsoft.com/office/officeart/2005/8/layout/process1"/>
-    <dgm:cxn modelId="{F6EB67DB-F866-45F1-902C-F2D6BDC23779}" type="presOf" srcId="{6E46E610-6AA3-4C4E-8A85-6DC6A62E248B}" destId="{81668A18-A5C4-481F-924E-91CBE598CF90}" srcOrd="0" destOrd="0" presId="urn:microsoft.com/office/officeart/2005/8/layout/process1"/>
-    <dgm:cxn modelId="{174D0F16-8657-483C-B58D-FDDCDD6C622B}" srcId="{BA80B3D6-D686-4335-B8FE-A5B174A91D1F}" destId="{17A8A248-E1DA-469F-A154-CBAC5D9778AB}" srcOrd="0" destOrd="0" parTransId="{E3C8D432-9B80-4370-B9AA-3C64CD61764F}" sibTransId="{4422F951-8E6C-4158-98BC-9114CDD18487}"/>
-    <dgm:cxn modelId="{3DC493F8-5B48-4FC5-BABD-95DC0BAAB2A7}" type="presOf" srcId="{4422F951-8E6C-4158-98BC-9114CDD18487}" destId="{FDB0FADC-49BB-4433-94F6-73BAE60CC01B}" srcOrd="0" destOrd="0" presId="urn:microsoft.com/office/officeart/2005/8/layout/process1"/>
-    <dgm:cxn modelId="{3C2D7F7A-0ECD-4B6F-B22B-38A66E112503}" type="presOf" srcId="{CCE039CF-CC13-4D3D-851B-AB1839045A98}" destId="{C2B5D9D2-D82E-407D-882B-8A8EEF511AFF}" srcOrd="0" destOrd="0" presId="urn:microsoft.com/office/officeart/2005/8/layout/process1"/>
-    <dgm:cxn modelId="{10FE49BB-B917-47BD-8A7A-41F8A583102C}" type="presOf" srcId="{424BD534-A5CD-4DA1-970B-96BC2B36FFFA}" destId="{A9B93654-13EA-4C3C-8C58-01B6F39C7E93}" srcOrd="0" destOrd="0" presId="urn:microsoft.com/office/officeart/2005/8/layout/process1"/>
-    <dgm:cxn modelId="{E8D939EE-BE19-4749-A012-A8BD5CBA70A3}" srcId="{BA80B3D6-D686-4335-B8FE-A5B174A91D1F}" destId="{6E46E610-6AA3-4C4E-8A85-6DC6A62E248B}" srcOrd="5" destOrd="0" parTransId="{823508B4-53E0-436F-8C0C-01AAB20F1F8B}" sibTransId="{58A25139-4C19-4DEF-BB4A-2C7D0C560D1E}"/>
-    <dgm:cxn modelId="{E7CFC45B-DF7A-4A53-8AD2-1EDC1D064D7D}" type="presOf" srcId="{D4EC1965-5E66-4F6A-B14C-48B89CF88F34}" destId="{1042CD11-4028-40C7-A3E4-3853786713BD}" srcOrd="0" destOrd="0" presId="urn:microsoft.com/office/officeart/2005/8/layout/process1"/>
-    <dgm:cxn modelId="{B45AA2E6-D816-418A-8CB3-0FAC27502E63}" type="presOf" srcId="{502ADAB4-0FBC-4569-99CE-21E1D5F6BC66}" destId="{84B384BA-4992-4177-9E54-19EAA20BCC7A}" srcOrd="0" destOrd="0" presId="urn:microsoft.com/office/officeart/2005/8/layout/process1"/>
+    <dgm:cxn modelId="{7EF4DE59-EE4D-429F-961F-C9CCE67F98A0}" type="presOf" srcId="{903E13AB-7FF9-4EF1-9CC8-42D43D9E5AF2}" destId="{F0252C6C-08EF-48C6-89C0-0C3E67BADC55}" srcOrd="0" destOrd="0" presId="urn:microsoft.com/office/officeart/2005/8/layout/process1"/>
+    <dgm:cxn modelId="{296F466E-FD74-4122-B044-D57410516D1D}" type="presOf" srcId="{98B9D415-3575-41DA-8A1E-7D3F389EAAB4}" destId="{B6D3413A-C5B6-47F8-B1A9-65F1039F4D3B}" srcOrd="0" destOrd="0" presId="urn:microsoft.com/office/officeart/2005/8/layout/process1"/>
     <dgm:cxn modelId="{976DF86D-1A8D-448E-8334-DA38467787F6}" type="presOf" srcId="{502ADAB4-0FBC-4569-99CE-21E1D5F6BC66}" destId="{45E28F72-793C-4B73-B565-78D783AB4F0D}" srcOrd="1" destOrd="0" presId="urn:microsoft.com/office/officeart/2005/8/layout/process1"/>
     <dgm:cxn modelId="{B8F3B7DF-0C43-42CF-9639-3F6ED87A8879}" type="presOf" srcId="{2F6FD728-9EA6-4228-BAD0-00E42898BAEE}" destId="{42370FF3-AFA1-404E-A02D-36439289E42F}" srcOrd="0" destOrd="0" presId="urn:microsoft.com/office/officeart/2005/8/layout/process1"/>
     <dgm:cxn modelId="{10A6AFFB-136F-4B46-B488-3FCEC86DF52E}" srcId="{BA80B3D6-D686-4335-B8FE-A5B174A91D1F}" destId="{98B9D415-3575-41DA-8A1E-7D3F389EAAB4}" srcOrd="4" destOrd="0" parTransId="{4BB043C2-7E2E-4EC1-9BF5-3822561939B1}" sibTransId="{903E13AB-7FF9-4EF1-9CC8-42D43D9E5AF2}"/>
+    <dgm:cxn modelId="{E7CFC45B-DF7A-4A53-8AD2-1EDC1D064D7D}" type="presOf" srcId="{D4EC1965-5E66-4F6A-B14C-48B89CF88F34}" destId="{1042CD11-4028-40C7-A3E4-3853786713BD}" srcOrd="0" destOrd="0" presId="urn:microsoft.com/office/officeart/2005/8/layout/process1"/>
+    <dgm:cxn modelId="{72341014-660C-4F4B-99DB-6D5B90535813}" type="presOf" srcId="{BA80B3D6-D686-4335-B8FE-A5B174A91D1F}" destId="{52A5986A-80EF-452F-B163-4F651F6E920E}" srcOrd="0" destOrd="0" presId="urn:microsoft.com/office/officeart/2005/8/layout/process1"/>
+    <dgm:cxn modelId="{63979777-6806-43D9-999F-7A795E3AE3BF}" srcId="{BA80B3D6-D686-4335-B8FE-A5B174A91D1F}" destId="{424BD534-A5CD-4DA1-970B-96BC2B36FFFA}" srcOrd="3" destOrd="0" parTransId="{A6527A33-AD89-4577-8B3C-398FC08D70E9}" sibTransId="{2F6FD728-9EA6-4228-BAD0-00E42898BAEE}"/>
+    <dgm:cxn modelId="{F6EB67DB-F866-45F1-902C-F2D6BDC23779}" type="presOf" srcId="{6E46E610-6AA3-4C4E-8A85-6DC6A62E248B}" destId="{81668A18-A5C4-481F-924E-91CBE598CF90}" srcOrd="0" destOrd="0" presId="urn:microsoft.com/office/officeart/2005/8/layout/process1"/>
+    <dgm:cxn modelId="{F7E4C5EA-DFF3-4CA5-B13C-89A73E0450D9}" type="presOf" srcId="{903E13AB-7FF9-4EF1-9CC8-42D43D9E5AF2}" destId="{005977C5-7746-4332-AB63-5565C2615FED}" srcOrd="1" destOrd="0" presId="urn:microsoft.com/office/officeart/2005/8/layout/process1"/>
     <dgm:cxn modelId="{F2DA0746-0CB3-4E86-A4F9-198901C93E9E}" type="presOf" srcId="{4422F951-8E6C-4158-98BC-9114CDD18487}" destId="{C70AAC22-CD4D-442E-9F76-A785E86CF564}" srcOrd="1" destOrd="0" presId="urn:microsoft.com/office/officeart/2005/8/layout/process1"/>
-    <dgm:cxn modelId="{63979777-6806-43D9-999F-7A795E3AE3BF}" srcId="{BA80B3D6-D686-4335-B8FE-A5B174A91D1F}" destId="{424BD534-A5CD-4DA1-970B-96BC2B36FFFA}" srcOrd="3" destOrd="0" parTransId="{A6527A33-AD89-4577-8B3C-398FC08D70E9}" sibTransId="{2F6FD728-9EA6-4228-BAD0-00E42898BAEE}"/>
     <dgm:cxn modelId="{342964B1-6106-4F57-988A-6EA084A830C3}" type="presOf" srcId="{0827E205-FFF6-4C97-99DA-E7CCB976213E}" destId="{861FB1F0-A09E-4914-B7FC-FCEA1CD04480}" srcOrd="1" destOrd="0" presId="urn:microsoft.com/office/officeart/2005/8/layout/process1"/>
-    <dgm:cxn modelId="{7EF4DE59-EE4D-429F-961F-C9CCE67F98A0}" type="presOf" srcId="{903E13AB-7FF9-4EF1-9CC8-42D43D9E5AF2}" destId="{F0252C6C-08EF-48C6-89C0-0C3E67BADC55}" srcOrd="0" destOrd="0" presId="urn:microsoft.com/office/officeart/2005/8/layout/process1"/>
+    <dgm:cxn modelId="{DE637EEF-7D91-4557-9E24-CE46690DD8EC}" type="presOf" srcId="{0827E205-FFF6-4C97-99DA-E7CCB976213E}" destId="{E608B5D3-1969-4012-8ADD-73D2E450020A}" srcOrd="0" destOrd="0" presId="urn:microsoft.com/office/officeart/2005/8/layout/process1"/>
+    <dgm:cxn modelId="{10FE49BB-B917-47BD-8A7A-41F8A583102C}" type="presOf" srcId="{424BD534-A5CD-4DA1-970B-96BC2B36FFFA}" destId="{A9B93654-13EA-4C3C-8C58-01B6F39C7E93}" srcOrd="0" destOrd="0" presId="urn:microsoft.com/office/officeart/2005/8/layout/process1"/>
+    <dgm:cxn modelId="{174D0F16-8657-483C-B58D-FDDCDD6C622B}" srcId="{BA80B3D6-D686-4335-B8FE-A5B174A91D1F}" destId="{17A8A248-E1DA-469F-A154-CBAC5D9778AB}" srcOrd="0" destOrd="0" parTransId="{E3C8D432-9B80-4370-B9AA-3C64CD61764F}" sibTransId="{4422F951-8E6C-4158-98BC-9114CDD18487}"/>
+    <dgm:cxn modelId="{F106EA50-CE0A-49EA-9830-F23364F8072D}" srcId="{BA80B3D6-D686-4335-B8FE-A5B174A91D1F}" destId="{CCE039CF-CC13-4D3D-851B-AB1839045A98}" srcOrd="1" destOrd="0" parTransId="{F7538E36-531A-4ABF-83F2-4D674DEF8E32}" sibTransId="{0827E205-FFF6-4C97-99DA-E7CCB976213E}"/>
+    <dgm:cxn modelId="{B45AA2E6-D816-418A-8CB3-0FAC27502E63}" type="presOf" srcId="{502ADAB4-0FBC-4569-99CE-21E1D5F6BC66}" destId="{84B384BA-4992-4177-9E54-19EAA20BCC7A}" srcOrd="0" destOrd="0" presId="urn:microsoft.com/office/officeart/2005/8/layout/process1"/>
+    <dgm:cxn modelId="{539D2639-9F77-4D02-BDA0-E03AA5E161DC}" type="presOf" srcId="{17A8A248-E1DA-469F-A154-CBAC5D9778AB}" destId="{0F705934-E6D1-499E-BDAA-C0A62992660D}" srcOrd="0" destOrd="0" presId="urn:microsoft.com/office/officeart/2005/8/layout/process1"/>
+    <dgm:cxn modelId="{F1DC2A5A-DC5A-417A-B6A0-A85C2DF10750}" srcId="{BA80B3D6-D686-4335-B8FE-A5B174A91D1F}" destId="{D4EC1965-5E66-4F6A-B14C-48B89CF88F34}" srcOrd="2" destOrd="0" parTransId="{FCD1FA7D-D905-468E-99B9-C7BD076FAC31}" sibTransId="{502ADAB4-0FBC-4569-99CE-21E1D5F6BC66}"/>
+    <dgm:cxn modelId="{3DC493F8-5B48-4FC5-BABD-95DC0BAAB2A7}" type="presOf" srcId="{4422F951-8E6C-4158-98BC-9114CDD18487}" destId="{FDB0FADC-49BB-4433-94F6-73BAE60CC01B}" srcOrd="0" destOrd="0" presId="urn:microsoft.com/office/officeart/2005/8/layout/process1"/>
+    <dgm:cxn modelId="{E8D939EE-BE19-4749-A012-A8BD5CBA70A3}" srcId="{BA80B3D6-D686-4335-B8FE-A5B174A91D1F}" destId="{6E46E610-6AA3-4C4E-8A85-6DC6A62E248B}" srcOrd="5" destOrd="0" parTransId="{823508B4-53E0-436F-8C0C-01AAB20F1F8B}" sibTransId="{58A25139-4C19-4DEF-BB4A-2C7D0C560D1E}"/>
+    <dgm:cxn modelId="{3C2D7F7A-0ECD-4B6F-B22B-38A66E112503}" type="presOf" srcId="{CCE039CF-CC13-4D3D-851B-AB1839045A98}" destId="{C2B5D9D2-D82E-407D-882B-8A8EEF511AFF}" srcOrd="0" destOrd="0" presId="urn:microsoft.com/office/officeart/2005/8/layout/process1"/>
     <dgm:cxn modelId="{65373FC5-E836-409F-BAFC-05BC7F6E6B33}" type="presOf" srcId="{2F6FD728-9EA6-4228-BAD0-00E42898BAEE}" destId="{09FB49E3-3A32-426F-90D7-C2DEEECBAE8A}" srcOrd="1" destOrd="0" presId="urn:microsoft.com/office/officeart/2005/8/layout/process1"/>
-    <dgm:cxn modelId="{DE637EEF-7D91-4557-9E24-CE46690DD8EC}" type="presOf" srcId="{0827E205-FFF6-4C97-99DA-E7CCB976213E}" destId="{E608B5D3-1969-4012-8ADD-73D2E450020A}" srcOrd="0" destOrd="0" presId="urn:microsoft.com/office/officeart/2005/8/layout/process1"/>
-    <dgm:cxn modelId="{296F466E-FD74-4122-B044-D57410516D1D}" type="presOf" srcId="{98B9D415-3575-41DA-8A1E-7D3F389EAAB4}" destId="{B6D3413A-C5B6-47F8-B1A9-65F1039F4D3B}" srcOrd="0" destOrd="0" presId="urn:microsoft.com/office/officeart/2005/8/layout/process1"/>
-    <dgm:cxn modelId="{F1DC2A5A-DC5A-417A-B6A0-A85C2DF10750}" srcId="{BA80B3D6-D686-4335-B8FE-A5B174A91D1F}" destId="{D4EC1965-5E66-4F6A-B14C-48B89CF88F34}" srcOrd="2" destOrd="0" parTransId="{FCD1FA7D-D905-468E-99B9-C7BD076FAC31}" sibTransId="{502ADAB4-0FBC-4569-99CE-21E1D5F6BC66}"/>
-    <dgm:cxn modelId="{539D2639-9F77-4D02-BDA0-E03AA5E161DC}" type="presOf" srcId="{17A8A248-E1DA-469F-A154-CBAC5D9778AB}" destId="{0F705934-E6D1-499E-BDAA-C0A62992660D}" srcOrd="0" destOrd="0" presId="urn:microsoft.com/office/officeart/2005/8/layout/process1"/>
     <dgm:cxn modelId="{154F3A88-0D71-4474-80F1-3DDE67E1ECF5}" type="presParOf" srcId="{52A5986A-80EF-452F-B163-4F651F6E920E}" destId="{0F705934-E6D1-499E-BDAA-C0A62992660D}" srcOrd="0" destOrd="0" presId="urn:microsoft.com/office/officeart/2005/8/layout/process1"/>
     <dgm:cxn modelId="{49A56BD7-86C7-4645-8591-9DFD38178B6A}" type="presParOf" srcId="{52A5986A-80EF-452F-B163-4F651F6E920E}" destId="{FDB0FADC-49BB-4433-94F6-73BAE60CC01B}" srcOrd="1" destOrd="0" presId="urn:microsoft.com/office/officeart/2005/8/layout/process1"/>
     <dgm:cxn modelId="{74459F2E-3A2E-4AE9-B678-DD30F1D9840D}" type="presParOf" srcId="{FDB0FADC-49BB-4433-94F6-73BAE60CC01B}" destId="{C70AAC22-CD4D-442E-9F76-A785E86CF564}" srcOrd="0" destOrd="0" presId="urn:microsoft.com/office/officeart/2005/8/layout/process1"/>
@@ -2780,6 +2780,924 @@
       <dsp:cNvGrpSpPr/>
     </dsp:nvGrpSpPr>
     <dsp:grpSpPr/>
+    <dsp:sp modelId="{0F705934-E6D1-499E-BDAA-C0A62992660D}">
+      <dsp:nvSpPr>
+        <dsp:cNvPr id="0" name=""/>
+        <dsp:cNvSpPr/>
+      </dsp:nvSpPr>
+      <dsp:spPr>
+        <a:xfrm>
+          <a:off x="1130072" y="1246087"/>
+          <a:ext cx="1571330" cy="1042286"/>
+        </a:xfrm>
+        <a:prstGeom prst="roundRect">
+          <a:avLst>
+            <a:gd name="adj" fmla="val 10000"/>
+          </a:avLst>
+        </a:prstGeom>
+        <a:solidFill>
+          <a:srgbClr val="F0847C"/>
+        </a:solidFill>
+        <a:ln>
+          <a:solidFill>
+            <a:srgbClr val="C00000"/>
+          </a:solidFill>
+        </a:ln>
+        <a:effectLst>
+          <a:outerShdw blurRad="38100" dist="25400" dir="2700000" algn="br" rotWithShape="0">
+            <a:srgbClr val="000000">
+              <a:alpha val="60000"/>
+            </a:srgbClr>
+          </a:outerShdw>
+        </a:effectLst>
+        <a:sp3d prstMaterial="plastic">
+          <a:bevelT w="50800" h="50800"/>
+          <a:bevelB w="50800" h="50800"/>
+        </a:sp3d>
+      </dsp:spPr>
+      <dsp:style>
+        <a:lnRef idx="0">
+          <a:scrgbClr r="0" g="0" b="0"/>
+        </a:lnRef>
+        <a:fillRef idx="1">
+          <a:scrgbClr r="0" g="0" b="0"/>
+        </a:fillRef>
+        <a:effectRef idx="2">
+          <a:scrgbClr r="0" g="0" b="0"/>
+        </a:effectRef>
+        <a:fontRef idx="minor">
+          <a:schemeClr val="lt1"/>
+        </a:fontRef>
+      </dsp:style>
+      <dsp:txBody>
+        <a:bodyPr spcFirstLastPara="0" vert="horz" wrap="square" lIns="91440" tIns="91440" rIns="91440" bIns="91440" numCol="1" spcCol="1270" anchor="ctr" anchorCtr="0">
+          <a:noAutofit/>
+        </a:bodyPr>
+        <a:lstStyle/>
+        <a:p>
+          <a:pPr lvl="0" algn="ctr" defTabSz="1066800">
+            <a:lnSpc>
+              <a:spcPct val="90000"/>
+            </a:lnSpc>
+            <a:spcBef>
+              <a:spcPct val="0"/>
+            </a:spcBef>
+            <a:spcAft>
+              <a:spcPct val="35000"/>
+            </a:spcAft>
+          </a:pPr>
+          <a:r>
+            <a:rPr lang="en-US" sz="2400" kern="1200" dirty="0" smtClean="0"/>
+            <a:t>ITC 2007 Data</a:t>
+          </a:r>
+          <a:endParaRPr lang="en-US" sz="2400" kern="1200" dirty="0"/>
+        </a:p>
+      </dsp:txBody>
+      <dsp:txXfrm>
+        <a:off x="1160600" y="1276615"/>
+        <a:ext cx="1510274" cy="981230"/>
+      </dsp:txXfrm>
+    </dsp:sp>
+    <dsp:sp modelId="{FDB0FADC-49BB-4433-94F6-73BAE60CC01B}">
+      <dsp:nvSpPr>
+        <dsp:cNvPr id="0" name=""/>
+        <dsp:cNvSpPr/>
+      </dsp:nvSpPr>
+      <dsp:spPr>
+        <a:xfrm>
+          <a:off x="2798525" y="1678579"/>
+          <a:ext cx="303784" cy="177302"/>
+        </a:xfrm>
+        <a:prstGeom prst="rightArrow">
+          <a:avLst>
+            <a:gd name="adj1" fmla="val 60000"/>
+            <a:gd name="adj2" fmla="val 50000"/>
+          </a:avLst>
+        </a:prstGeom>
+        <a:solidFill>
+          <a:schemeClr val="accent1">
+            <a:tint val="60000"/>
+            <a:hueOff val="0"/>
+            <a:satOff val="0"/>
+            <a:lumOff val="0"/>
+            <a:alphaOff val="0"/>
+          </a:schemeClr>
+        </a:solidFill>
+        <a:ln w="12700" cap="flat" cmpd="sng" algn="ctr">
+          <a:solidFill>
+            <a:schemeClr val="accent1">
+              <a:tint val="60000"/>
+              <a:hueOff val="0"/>
+              <a:satOff val="0"/>
+              <a:lumOff val="0"/>
+              <a:alphaOff val="0"/>
+            </a:schemeClr>
+          </a:solidFill>
+          <a:prstDash val="solid"/>
+        </a:ln>
+        <a:effectLst>
+          <a:outerShdw blurRad="38100" dist="25400" dir="2700000" algn="br" rotWithShape="0">
+            <a:srgbClr val="000000">
+              <a:alpha val="60000"/>
+            </a:srgbClr>
+          </a:outerShdw>
+        </a:effectLst>
+        <a:sp3d z="-25400" prstMaterial="plastic">
+          <a:bevelT w="25400" h="25400"/>
+          <a:bevelB w="25400" h="25400"/>
+        </a:sp3d>
+      </dsp:spPr>
+      <dsp:style>
+        <a:lnRef idx="1">
+          <a:scrgbClr r="0" g="0" b="0"/>
+        </a:lnRef>
+        <a:fillRef idx="1">
+          <a:scrgbClr r="0" g="0" b="0"/>
+        </a:fillRef>
+        <a:effectRef idx="2">
+          <a:scrgbClr r="0" g="0" b="0"/>
+        </a:effectRef>
+        <a:fontRef idx="minor">
+          <a:schemeClr val="lt1"/>
+        </a:fontRef>
+      </dsp:style>
+      <dsp:txBody>
+        <a:bodyPr spcFirstLastPara="0" vert="horz" wrap="square" lIns="0" tIns="0" rIns="0" bIns="0" numCol="1" spcCol="1270" anchor="ctr" anchorCtr="0">
+          <a:noAutofit/>
+        </a:bodyPr>
+        <a:lstStyle/>
+        <a:p>
+          <a:pPr lvl="0" algn="ctr" defTabSz="311150">
+            <a:lnSpc>
+              <a:spcPct val="90000"/>
+            </a:lnSpc>
+            <a:spcBef>
+              <a:spcPct val="0"/>
+            </a:spcBef>
+            <a:spcAft>
+              <a:spcPct val="35000"/>
+            </a:spcAft>
+          </a:pPr>
+          <a:endParaRPr lang="en-US" sz="700" kern="1200"/>
+        </a:p>
+      </dsp:txBody>
+      <dsp:txXfrm>
+        <a:off x="2798525" y="1714039"/>
+        <a:ext cx="250593" cy="106382"/>
+      </dsp:txXfrm>
+    </dsp:sp>
+    <dsp:sp modelId="{C2B5D9D2-D82E-407D-882B-8A8EEF511AFF}">
+      <dsp:nvSpPr>
+        <dsp:cNvPr id="0" name=""/>
+        <dsp:cNvSpPr/>
+      </dsp:nvSpPr>
+      <dsp:spPr>
+        <a:xfrm>
+          <a:off x="3184926" y="1246087"/>
+          <a:ext cx="1571330" cy="1042286"/>
+        </a:xfrm>
+        <a:prstGeom prst="roundRect">
+          <a:avLst>
+            <a:gd name="adj" fmla="val 10000"/>
+          </a:avLst>
+        </a:prstGeom>
+        <a:solidFill>
+          <a:schemeClr val="accent1">
+            <a:hueOff val="0"/>
+            <a:satOff val="0"/>
+            <a:lumOff val="0"/>
+            <a:alphaOff val="0"/>
+          </a:schemeClr>
+        </a:solidFill>
+        <a:ln>
+          <a:noFill/>
+        </a:ln>
+        <a:effectLst>
+          <a:outerShdw blurRad="38100" dist="25400" dir="2700000" algn="br" rotWithShape="0">
+            <a:srgbClr val="000000">
+              <a:alpha val="60000"/>
+            </a:srgbClr>
+          </a:outerShdw>
+        </a:effectLst>
+        <a:sp3d prstMaterial="plastic">
+          <a:bevelT w="50800" h="50800"/>
+          <a:bevelB w="50800" h="50800"/>
+        </a:sp3d>
+      </dsp:spPr>
+      <dsp:style>
+        <a:lnRef idx="0">
+          <a:scrgbClr r="0" g="0" b="0"/>
+        </a:lnRef>
+        <a:fillRef idx="1">
+          <a:scrgbClr r="0" g="0" b="0"/>
+        </a:fillRef>
+        <a:effectRef idx="2">
+          <a:scrgbClr r="0" g="0" b="0"/>
+        </a:effectRef>
+        <a:fontRef idx="minor">
+          <a:schemeClr val="lt1"/>
+        </a:fontRef>
+      </dsp:style>
+      <dsp:txBody>
+        <a:bodyPr spcFirstLastPara="0" vert="horz" wrap="square" lIns="91440" tIns="91440" rIns="91440" bIns="91440" numCol="1" spcCol="1270" anchor="ctr" anchorCtr="0">
+          <a:noAutofit/>
+        </a:bodyPr>
+        <a:lstStyle/>
+        <a:p>
+          <a:pPr lvl="0" algn="ctr" defTabSz="1066800">
+            <a:lnSpc>
+              <a:spcPct val="90000"/>
+            </a:lnSpc>
+            <a:spcBef>
+              <a:spcPct val="0"/>
+            </a:spcBef>
+            <a:spcAft>
+              <a:spcPct val="35000"/>
+            </a:spcAft>
+          </a:pPr>
+          <a:r>
+            <a:rPr lang="en-US" sz="2400" kern="1200" dirty="0" smtClean="0"/>
+            <a:t>Loader</a:t>
+          </a:r>
+          <a:endParaRPr lang="en-US" sz="2400" kern="1200" dirty="0"/>
+        </a:p>
+      </dsp:txBody>
+      <dsp:txXfrm>
+        <a:off x="3215454" y="1276615"/>
+        <a:ext cx="1510274" cy="981230"/>
+      </dsp:txXfrm>
+    </dsp:sp>
+    <dsp:sp modelId="{E608B5D3-1969-4012-8ADD-73D2E450020A}">
+      <dsp:nvSpPr>
+        <dsp:cNvPr id="0" name=""/>
+        <dsp:cNvSpPr/>
+      </dsp:nvSpPr>
+      <dsp:spPr>
+        <a:xfrm>
+          <a:off x="4855265" y="1678579"/>
+          <a:ext cx="309687" cy="177302"/>
+        </a:xfrm>
+        <a:prstGeom prst="rightArrow">
+          <a:avLst>
+            <a:gd name="adj1" fmla="val 60000"/>
+            <a:gd name="adj2" fmla="val 50000"/>
+          </a:avLst>
+        </a:prstGeom>
+        <a:solidFill>
+          <a:schemeClr val="accent1">
+            <a:tint val="60000"/>
+            <a:hueOff val="0"/>
+            <a:satOff val="0"/>
+            <a:lumOff val="0"/>
+            <a:alphaOff val="0"/>
+          </a:schemeClr>
+        </a:solidFill>
+        <a:ln w="12700" cap="flat" cmpd="sng" algn="ctr">
+          <a:solidFill>
+            <a:schemeClr val="accent1">
+              <a:tint val="60000"/>
+              <a:hueOff val="0"/>
+              <a:satOff val="0"/>
+              <a:lumOff val="0"/>
+              <a:alphaOff val="0"/>
+            </a:schemeClr>
+          </a:solidFill>
+          <a:prstDash val="solid"/>
+        </a:ln>
+        <a:effectLst>
+          <a:outerShdw blurRad="38100" dist="25400" dir="2700000" algn="br" rotWithShape="0">
+            <a:srgbClr val="000000">
+              <a:alpha val="60000"/>
+            </a:srgbClr>
+          </a:outerShdw>
+        </a:effectLst>
+        <a:sp3d z="-25400" prstMaterial="plastic">
+          <a:bevelT w="25400" h="25400"/>
+          <a:bevelB w="25400" h="25400"/>
+        </a:sp3d>
+      </dsp:spPr>
+      <dsp:style>
+        <a:lnRef idx="1">
+          <a:scrgbClr r="0" g="0" b="0"/>
+        </a:lnRef>
+        <a:fillRef idx="1">
+          <a:scrgbClr r="0" g="0" b="0"/>
+        </a:fillRef>
+        <a:effectRef idx="2">
+          <a:scrgbClr r="0" g="0" b="0"/>
+        </a:effectRef>
+        <a:fontRef idx="minor">
+          <a:schemeClr val="lt1"/>
+        </a:fontRef>
+      </dsp:style>
+      <dsp:txBody>
+        <a:bodyPr spcFirstLastPara="0" vert="horz" wrap="square" lIns="0" tIns="0" rIns="0" bIns="0" numCol="1" spcCol="1270" anchor="ctr" anchorCtr="0">
+          <a:noAutofit/>
+        </a:bodyPr>
+        <a:lstStyle/>
+        <a:p>
+          <a:pPr lvl="0" algn="ctr" defTabSz="311150">
+            <a:lnSpc>
+              <a:spcPct val="90000"/>
+            </a:lnSpc>
+            <a:spcBef>
+              <a:spcPct val="0"/>
+            </a:spcBef>
+            <a:spcAft>
+              <a:spcPct val="35000"/>
+            </a:spcAft>
+          </a:pPr>
+          <a:endParaRPr lang="en-US" sz="700" kern="1200"/>
+        </a:p>
+      </dsp:txBody>
+      <dsp:txXfrm>
+        <a:off x="4855265" y="1714039"/>
+        <a:ext cx="256496" cy="106382"/>
+      </dsp:txXfrm>
+    </dsp:sp>
+    <dsp:sp modelId="{1042CD11-4028-40C7-A3E4-3853786713BD}">
+      <dsp:nvSpPr>
+        <dsp:cNvPr id="0" name=""/>
+        <dsp:cNvSpPr/>
+      </dsp:nvSpPr>
+      <dsp:spPr>
+        <a:xfrm>
+          <a:off x="5249174" y="1246087"/>
+          <a:ext cx="1571330" cy="1042286"/>
+        </a:xfrm>
+        <a:prstGeom prst="roundRect">
+          <a:avLst>
+            <a:gd name="adj" fmla="val 10000"/>
+          </a:avLst>
+        </a:prstGeom>
+        <a:solidFill>
+          <a:schemeClr val="accent1">
+            <a:hueOff val="0"/>
+            <a:satOff val="0"/>
+            <a:lumOff val="0"/>
+            <a:alphaOff val="0"/>
+          </a:schemeClr>
+        </a:solidFill>
+        <a:ln>
+          <a:noFill/>
+        </a:ln>
+        <a:effectLst>
+          <a:outerShdw blurRad="38100" dist="25400" dir="2700000" algn="br" rotWithShape="0">
+            <a:srgbClr val="000000">
+              <a:alpha val="60000"/>
+            </a:srgbClr>
+          </a:outerShdw>
+        </a:effectLst>
+        <a:sp3d prstMaterial="plastic">
+          <a:bevelT w="50800" h="50800"/>
+          <a:bevelB w="50800" h="50800"/>
+        </a:sp3d>
+      </dsp:spPr>
+      <dsp:style>
+        <a:lnRef idx="0">
+          <a:scrgbClr r="0" g="0" b="0"/>
+        </a:lnRef>
+        <a:fillRef idx="1">
+          <a:scrgbClr r="0" g="0" b="0"/>
+        </a:fillRef>
+        <a:effectRef idx="2">
+          <a:scrgbClr r="0" g="0" b="0"/>
+        </a:effectRef>
+        <a:fontRef idx="minor">
+          <a:schemeClr val="lt1"/>
+        </a:fontRef>
+      </dsp:style>
+      <dsp:txBody>
+        <a:bodyPr spcFirstLastPara="0" vert="horz" wrap="square" lIns="91440" tIns="91440" rIns="91440" bIns="91440" numCol="1" spcCol="1270" anchor="ctr" anchorCtr="0">
+          <a:noAutofit/>
+        </a:bodyPr>
+        <a:lstStyle/>
+        <a:p>
+          <a:pPr lvl="0" algn="ctr" defTabSz="1066800">
+            <a:lnSpc>
+              <a:spcPct val="90000"/>
+            </a:lnSpc>
+            <a:spcBef>
+              <a:spcPct val="0"/>
+            </a:spcBef>
+            <a:spcAft>
+              <a:spcPct val="35000"/>
+            </a:spcAft>
+          </a:pPr>
+          <a:r>
+            <a:rPr lang="en-US" sz="2400" kern="1200" dirty="0" smtClean="0"/>
+            <a:t>Graph Coloring</a:t>
+          </a:r>
+          <a:endParaRPr lang="en-US" sz="2400" kern="1200" dirty="0"/>
+        </a:p>
+      </dsp:txBody>
+      <dsp:txXfrm>
+        <a:off x="5279702" y="1276615"/>
+        <a:ext cx="1510274" cy="981230"/>
+      </dsp:txXfrm>
+    </dsp:sp>
+    <dsp:sp modelId="{84B384BA-4992-4177-9E54-19EAA20BCC7A}">
+      <dsp:nvSpPr>
+        <dsp:cNvPr id="0" name=""/>
+        <dsp:cNvSpPr/>
+      </dsp:nvSpPr>
+      <dsp:spPr>
+        <a:xfrm rot="7781952">
+          <a:off x="4313698" y="2900117"/>
+          <a:ext cx="922044" cy="177302"/>
+        </a:xfrm>
+        <a:prstGeom prst="rightArrow">
+          <a:avLst>
+            <a:gd name="adj1" fmla="val 60000"/>
+            <a:gd name="adj2" fmla="val 50000"/>
+          </a:avLst>
+        </a:prstGeom>
+        <a:solidFill>
+          <a:schemeClr val="accent1">
+            <a:tint val="60000"/>
+            <a:hueOff val="0"/>
+            <a:satOff val="0"/>
+            <a:lumOff val="0"/>
+            <a:alphaOff val="0"/>
+          </a:schemeClr>
+        </a:solidFill>
+        <a:ln w="12700" cap="flat" cmpd="sng" algn="ctr">
+          <a:solidFill>
+            <a:schemeClr val="accent1">
+              <a:tint val="60000"/>
+              <a:hueOff val="0"/>
+              <a:satOff val="0"/>
+              <a:lumOff val="0"/>
+              <a:alphaOff val="0"/>
+            </a:schemeClr>
+          </a:solidFill>
+          <a:prstDash val="solid"/>
+        </a:ln>
+        <a:effectLst>
+          <a:outerShdw blurRad="38100" dist="25400" dir="2700000" algn="br" rotWithShape="0">
+            <a:srgbClr val="000000">
+              <a:alpha val="60000"/>
+            </a:srgbClr>
+          </a:outerShdw>
+        </a:effectLst>
+        <a:sp3d z="-25400" prstMaterial="plastic">
+          <a:bevelT w="25400" h="25400"/>
+          <a:bevelB w="25400" h="25400"/>
+        </a:sp3d>
+      </dsp:spPr>
+      <dsp:style>
+        <a:lnRef idx="1">
+          <a:scrgbClr r="0" g="0" b="0"/>
+        </a:lnRef>
+        <a:fillRef idx="1">
+          <a:scrgbClr r="0" g="0" b="0"/>
+        </a:fillRef>
+        <a:effectRef idx="2">
+          <a:scrgbClr r="0" g="0" b="0"/>
+        </a:effectRef>
+        <a:fontRef idx="minor">
+          <a:schemeClr val="lt1"/>
+        </a:fontRef>
+      </dsp:style>
+      <dsp:txBody>
+        <a:bodyPr spcFirstLastPara="0" vert="horz" wrap="square" lIns="0" tIns="0" rIns="0" bIns="0" numCol="1" spcCol="1270" anchor="ctr" anchorCtr="0">
+          <a:noAutofit/>
+        </a:bodyPr>
+        <a:lstStyle/>
+        <a:p>
+          <a:pPr lvl="0" algn="ctr" defTabSz="311150">
+            <a:lnSpc>
+              <a:spcPct val="90000"/>
+            </a:lnSpc>
+            <a:spcBef>
+              <a:spcPct val="0"/>
+            </a:spcBef>
+            <a:spcAft>
+              <a:spcPct val="35000"/>
+            </a:spcAft>
+          </a:pPr>
+          <a:endParaRPr lang="en-US" sz="700" kern="1200"/>
+        </a:p>
+      </dsp:txBody>
+      <dsp:txXfrm rot="10800000">
+        <a:off x="4357282" y="2915114"/>
+        <a:ext cx="868853" cy="106382"/>
+      </dsp:txXfrm>
+    </dsp:sp>
+    <dsp:sp modelId="{A9B93654-13EA-4C3C-8C58-01B6F39C7E93}">
+      <dsp:nvSpPr>
+        <dsp:cNvPr id="0" name=""/>
+        <dsp:cNvSpPr/>
+      </dsp:nvSpPr>
+      <dsp:spPr>
+        <a:xfrm>
+          <a:off x="3144800" y="3626919"/>
+          <a:ext cx="1826982" cy="1042286"/>
+        </a:xfrm>
+        <a:prstGeom prst="roundRect">
+          <a:avLst>
+            <a:gd name="adj" fmla="val 10000"/>
+          </a:avLst>
+        </a:prstGeom>
+        <a:solidFill>
+          <a:schemeClr val="accent1">
+            <a:hueOff val="0"/>
+            <a:satOff val="0"/>
+            <a:lumOff val="0"/>
+            <a:alphaOff val="0"/>
+          </a:schemeClr>
+        </a:solidFill>
+        <a:ln>
+          <a:noFill/>
+        </a:ln>
+        <a:effectLst>
+          <a:outerShdw blurRad="38100" dist="25400" dir="2700000" algn="br" rotWithShape="0">
+            <a:srgbClr val="000000">
+              <a:alpha val="60000"/>
+            </a:srgbClr>
+          </a:outerShdw>
+        </a:effectLst>
+        <a:sp3d prstMaterial="plastic">
+          <a:bevelT w="50800" h="50800"/>
+          <a:bevelB w="50800" h="50800"/>
+        </a:sp3d>
+      </dsp:spPr>
+      <dsp:style>
+        <a:lnRef idx="0">
+          <a:scrgbClr r="0" g="0" b="0"/>
+        </a:lnRef>
+        <a:fillRef idx="1">
+          <a:scrgbClr r="0" g="0" b="0"/>
+        </a:fillRef>
+        <a:effectRef idx="2">
+          <a:scrgbClr r="0" g="0" b="0"/>
+        </a:effectRef>
+        <a:fontRef idx="minor">
+          <a:schemeClr val="lt1"/>
+        </a:fontRef>
+      </dsp:style>
+      <dsp:txBody>
+        <a:bodyPr spcFirstLastPara="0" vert="horz" wrap="square" lIns="91440" tIns="91440" rIns="91440" bIns="91440" numCol="1" spcCol="1270" anchor="ctr" anchorCtr="0">
+          <a:noAutofit/>
+        </a:bodyPr>
+        <a:lstStyle/>
+        <a:p>
+          <a:pPr lvl="0" algn="ctr" defTabSz="1066800">
+            <a:lnSpc>
+              <a:spcPct val="90000"/>
+            </a:lnSpc>
+            <a:spcBef>
+              <a:spcPct val="0"/>
+            </a:spcBef>
+            <a:spcAft>
+              <a:spcPct val="35000"/>
+            </a:spcAft>
+          </a:pPr>
+          <a:r>
+            <a:rPr lang="en-US" sz="2400" kern="1200" dirty="0" smtClean="0"/>
+            <a:t>Simulated Annealing</a:t>
+          </a:r>
+          <a:endParaRPr lang="en-US" sz="2400" kern="1200" dirty="0"/>
+        </a:p>
+      </dsp:txBody>
+      <dsp:txXfrm>
+        <a:off x="3175328" y="3657447"/>
+        <a:ext cx="1765926" cy="981230"/>
+      </dsp:txXfrm>
+    </dsp:sp>
+    <dsp:sp modelId="{42370FF3-AFA1-404E-A02D-36439289E42F}">
+      <dsp:nvSpPr>
+        <dsp:cNvPr id="0" name=""/>
+        <dsp:cNvSpPr/>
+      </dsp:nvSpPr>
+      <dsp:spPr>
+        <a:xfrm>
+          <a:off x="5076202" y="4059411"/>
+          <a:ext cx="326610" cy="177302"/>
+        </a:xfrm>
+        <a:prstGeom prst="rightArrow">
+          <a:avLst>
+            <a:gd name="adj1" fmla="val 60000"/>
+            <a:gd name="adj2" fmla="val 50000"/>
+          </a:avLst>
+        </a:prstGeom>
+        <a:solidFill>
+          <a:schemeClr val="accent1">
+            <a:tint val="60000"/>
+            <a:hueOff val="0"/>
+            <a:satOff val="0"/>
+            <a:lumOff val="0"/>
+            <a:alphaOff val="0"/>
+          </a:schemeClr>
+        </a:solidFill>
+        <a:ln w="12700" cap="flat" cmpd="sng" algn="ctr">
+          <a:solidFill>
+            <a:schemeClr val="accent1">
+              <a:tint val="60000"/>
+              <a:hueOff val="0"/>
+              <a:satOff val="0"/>
+              <a:lumOff val="0"/>
+              <a:alphaOff val="0"/>
+            </a:schemeClr>
+          </a:solidFill>
+          <a:prstDash val="solid"/>
+        </a:ln>
+        <a:effectLst>
+          <a:outerShdw blurRad="38100" dist="25400" dir="2700000" algn="br" rotWithShape="0">
+            <a:srgbClr val="000000">
+              <a:alpha val="60000"/>
+            </a:srgbClr>
+          </a:outerShdw>
+        </a:effectLst>
+        <a:sp3d z="-25400" prstMaterial="plastic">
+          <a:bevelT w="25400" h="25400"/>
+          <a:bevelB w="25400" h="25400"/>
+        </a:sp3d>
+      </dsp:spPr>
+      <dsp:style>
+        <a:lnRef idx="1">
+          <a:scrgbClr r="0" g="0" b="0"/>
+        </a:lnRef>
+        <a:fillRef idx="1">
+          <a:scrgbClr r="0" g="0" b="0"/>
+        </a:fillRef>
+        <a:effectRef idx="2">
+          <a:scrgbClr r="0" g="0" b="0"/>
+        </a:effectRef>
+        <a:fontRef idx="minor">
+          <a:schemeClr val="lt1"/>
+        </a:fontRef>
+      </dsp:style>
+      <dsp:txBody>
+        <a:bodyPr spcFirstLastPara="0" vert="horz" wrap="square" lIns="0" tIns="0" rIns="0" bIns="0" numCol="1" spcCol="1270" anchor="ctr" anchorCtr="0">
+          <a:noAutofit/>
+        </a:bodyPr>
+        <a:lstStyle/>
+        <a:p>
+          <a:pPr lvl="0" algn="ctr" defTabSz="311150">
+            <a:lnSpc>
+              <a:spcPct val="90000"/>
+            </a:lnSpc>
+            <a:spcBef>
+              <a:spcPct val="0"/>
+            </a:spcBef>
+            <a:spcAft>
+              <a:spcPct val="35000"/>
+            </a:spcAft>
+          </a:pPr>
+          <a:endParaRPr lang="en-US" sz="700" kern="1200"/>
+        </a:p>
+      </dsp:txBody>
+      <dsp:txXfrm>
+        <a:off x="5076202" y="4094871"/>
+        <a:ext cx="273419" cy="106382"/>
+      </dsp:txXfrm>
+    </dsp:sp>
+    <dsp:sp modelId="{B6D3413A-C5B6-47F8-B1A9-65F1039F4D3B}">
+      <dsp:nvSpPr>
+        <dsp:cNvPr id="0" name=""/>
+        <dsp:cNvSpPr/>
+      </dsp:nvSpPr>
+      <dsp:spPr>
+        <a:xfrm>
+          <a:off x="5491636" y="3626919"/>
+          <a:ext cx="1826982" cy="1042286"/>
+        </a:xfrm>
+        <a:prstGeom prst="roundRect">
+          <a:avLst>
+            <a:gd name="adj" fmla="val 10000"/>
+          </a:avLst>
+        </a:prstGeom>
+        <a:solidFill>
+          <a:schemeClr val="accent1">
+            <a:hueOff val="0"/>
+            <a:satOff val="0"/>
+            <a:lumOff val="0"/>
+            <a:alphaOff val="0"/>
+          </a:schemeClr>
+        </a:solidFill>
+        <a:ln>
+          <a:noFill/>
+        </a:ln>
+        <a:effectLst>
+          <a:outerShdw blurRad="38100" dist="25400" dir="2700000" algn="br" rotWithShape="0">
+            <a:srgbClr val="000000">
+              <a:alpha val="60000"/>
+            </a:srgbClr>
+          </a:outerShdw>
+        </a:effectLst>
+        <a:sp3d prstMaterial="plastic">
+          <a:bevelT w="50800" h="50800"/>
+          <a:bevelB w="50800" h="50800"/>
+        </a:sp3d>
+      </dsp:spPr>
+      <dsp:style>
+        <a:lnRef idx="0">
+          <a:scrgbClr r="0" g="0" b="0"/>
+        </a:lnRef>
+        <a:fillRef idx="1">
+          <a:scrgbClr r="0" g="0" b="0"/>
+        </a:fillRef>
+        <a:effectRef idx="2">
+          <a:scrgbClr r="0" g="0" b="0"/>
+        </a:effectRef>
+        <a:fontRef idx="minor">
+          <a:schemeClr val="lt1"/>
+        </a:fontRef>
+      </dsp:style>
+      <dsp:txBody>
+        <a:bodyPr spcFirstLastPara="0" vert="horz" wrap="square" lIns="91440" tIns="91440" rIns="91440" bIns="91440" numCol="1" spcCol="1270" anchor="ctr" anchorCtr="0">
+          <a:noAutofit/>
+        </a:bodyPr>
+        <a:lstStyle/>
+        <a:p>
+          <a:pPr lvl="0" algn="ctr" defTabSz="1066800">
+            <a:lnSpc>
+              <a:spcPct val="90000"/>
+            </a:lnSpc>
+            <a:spcBef>
+              <a:spcPct val="0"/>
+            </a:spcBef>
+            <a:spcAft>
+              <a:spcPct val="35000"/>
+            </a:spcAft>
+          </a:pPr>
+          <a:r>
+            <a:rPr lang="en-US" sz="2400" kern="1200" dirty="0" smtClean="0"/>
+            <a:t>Hill Climbing</a:t>
+          </a:r>
+          <a:endParaRPr lang="en-US" sz="2400" kern="1200" dirty="0"/>
+        </a:p>
+      </dsp:txBody>
+      <dsp:txXfrm>
+        <a:off x="5522164" y="3657447"/>
+        <a:ext cx="1765926" cy="981230"/>
+      </dsp:txXfrm>
+    </dsp:sp>
+    <dsp:sp modelId="{F0252C6C-08EF-48C6-89C0-0C3E67BADC55}">
+      <dsp:nvSpPr>
+        <dsp:cNvPr id="0" name=""/>
+        <dsp:cNvSpPr/>
+      </dsp:nvSpPr>
+      <dsp:spPr>
+        <a:xfrm rot="15860">
+          <a:off x="7414503" y="4064759"/>
+          <a:ext cx="299921" cy="177302"/>
+        </a:xfrm>
+        <a:prstGeom prst="rightArrow">
+          <a:avLst>
+            <a:gd name="adj1" fmla="val 60000"/>
+            <a:gd name="adj2" fmla="val 50000"/>
+          </a:avLst>
+        </a:prstGeom>
+        <a:solidFill>
+          <a:schemeClr val="accent1">
+            <a:tint val="60000"/>
+            <a:hueOff val="0"/>
+            <a:satOff val="0"/>
+            <a:lumOff val="0"/>
+            <a:alphaOff val="0"/>
+          </a:schemeClr>
+        </a:solidFill>
+        <a:ln w="12700" cap="flat" cmpd="sng" algn="ctr">
+          <a:solidFill>
+            <a:schemeClr val="accent1">
+              <a:tint val="60000"/>
+              <a:hueOff val="0"/>
+              <a:satOff val="0"/>
+              <a:lumOff val="0"/>
+              <a:alphaOff val="0"/>
+            </a:schemeClr>
+          </a:solidFill>
+          <a:prstDash val="solid"/>
+        </a:ln>
+        <a:effectLst>
+          <a:outerShdw blurRad="38100" dist="25400" dir="2700000" algn="br" rotWithShape="0">
+            <a:srgbClr val="000000">
+              <a:alpha val="60000"/>
+            </a:srgbClr>
+          </a:outerShdw>
+        </a:effectLst>
+        <a:sp3d z="-25400" prstMaterial="plastic">
+          <a:bevelT w="25400" h="25400"/>
+          <a:bevelB w="25400" h="25400"/>
+        </a:sp3d>
+      </dsp:spPr>
+      <dsp:style>
+        <a:lnRef idx="1">
+          <a:scrgbClr r="0" g="0" b="0"/>
+        </a:lnRef>
+        <a:fillRef idx="1">
+          <a:scrgbClr r="0" g="0" b="0"/>
+        </a:fillRef>
+        <a:effectRef idx="2">
+          <a:scrgbClr r="0" g="0" b="0"/>
+        </a:effectRef>
+        <a:fontRef idx="minor">
+          <a:schemeClr val="lt1"/>
+        </a:fontRef>
+      </dsp:style>
+      <dsp:txBody>
+        <a:bodyPr spcFirstLastPara="0" vert="horz" wrap="square" lIns="0" tIns="0" rIns="0" bIns="0" numCol="1" spcCol="1270" anchor="ctr" anchorCtr="0">
+          <a:noAutofit/>
+        </a:bodyPr>
+        <a:lstStyle/>
+        <a:p>
+          <a:pPr lvl="0" algn="ctr" defTabSz="311150">
+            <a:lnSpc>
+              <a:spcPct val="90000"/>
+            </a:lnSpc>
+            <a:spcBef>
+              <a:spcPct val="0"/>
+            </a:spcBef>
+            <a:spcAft>
+              <a:spcPct val="35000"/>
+            </a:spcAft>
+          </a:pPr>
+          <a:endParaRPr lang="en-US" sz="700" kern="1200"/>
+        </a:p>
+      </dsp:txBody>
+      <dsp:txXfrm>
+        <a:off x="7414503" y="4100096"/>
+        <a:ext cx="246730" cy="106382"/>
+      </dsp:txXfrm>
+    </dsp:sp>
+    <dsp:sp modelId="{81668A18-A5C4-481F-924E-91CBE598CF90}">
+      <dsp:nvSpPr>
+        <dsp:cNvPr id="0" name=""/>
+        <dsp:cNvSpPr/>
+      </dsp:nvSpPr>
+      <dsp:spPr>
+        <a:xfrm>
+          <a:off x="7795987" y="3637550"/>
+          <a:ext cx="1826982" cy="1042286"/>
+        </a:xfrm>
+        <a:prstGeom prst="roundRect">
+          <a:avLst>
+            <a:gd name="adj" fmla="val 10000"/>
+          </a:avLst>
+        </a:prstGeom>
+        <a:solidFill>
+          <a:schemeClr val="accent4"/>
+        </a:solidFill>
+        <a:ln>
+          <a:noFill/>
+        </a:ln>
+        <a:effectLst>
+          <a:outerShdw blurRad="38100" dist="25400" dir="2700000" algn="br" rotWithShape="0">
+            <a:srgbClr val="000000">
+              <a:alpha val="60000"/>
+            </a:srgbClr>
+          </a:outerShdw>
+        </a:effectLst>
+        <a:sp3d prstMaterial="plastic">
+          <a:bevelT w="50800" h="50800"/>
+          <a:bevelB w="50800" h="50800"/>
+        </a:sp3d>
+      </dsp:spPr>
+      <dsp:style>
+        <a:lnRef idx="0">
+          <a:scrgbClr r="0" g="0" b="0"/>
+        </a:lnRef>
+        <a:fillRef idx="1">
+          <a:scrgbClr r="0" g="0" b="0"/>
+        </a:fillRef>
+        <a:effectRef idx="2">
+          <a:scrgbClr r="0" g="0" b="0"/>
+        </a:effectRef>
+        <a:fontRef idx="minor">
+          <a:schemeClr val="lt1"/>
+        </a:fontRef>
+      </dsp:style>
+      <dsp:txBody>
+        <a:bodyPr spcFirstLastPara="0" vert="horz" wrap="square" lIns="91440" tIns="91440" rIns="91440" bIns="91440" numCol="1" spcCol="1270" anchor="ctr" anchorCtr="0">
+          <a:noAutofit/>
+        </a:bodyPr>
+        <a:lstStyle/>
+        <a:p>
+          <a:pPr lvl="0" algn="ctr" defTabSz="1066800">
+            <a:lnSpc>
+              <a:spcPct val="90000"/>
+            </a:lnSpc>
+            <a:spcBef>
+              <a:spcPct val="0"/>
+            </a:spcBef>
+            <a:spcAft>
+              <a:spcPct val="35000"/>
+            </a:spcAft>
+          </a:pPr>
+          <a:r>
+            <a:rPr lang="en-US" sz="2400" kern="1200" dirty="0" smtClean="0"/>
+            <a:t>Examination Timetable</a:t>
+          </a:r>
+          <a:endParaRPr lang="en-US" sz="2400" kern="1200" dirty="0"/>
+        </a:p>
+      </dsp:txBody>
+      <dsp:txXfrm>
+        <a:off x="7826515" y="3668078"/>
+        <a:ext cx="1765926" cy="981230"/>
+      </dsp:txXfrm>
+    </dsp:sp>
   </dsp:spTree>
 </dsp:drawing>
 </file>
@@ -2792,6 +3710,515 @@
       <dsp:cNvGrpSpPr/>
     </dsp:nvGrpSpPr>
     <dsp:grpSpPr/>
+    <dsp:sp modelId="{00128358-36EF-46A2-B8D4-2BD6293B510C}">
+      <dsp:nvSpPr>
+        <dsp:cNvPr id="0" name=""/>
+        <dsp:cNvSpPr/>
+      </dsp:nvSpPr>
+      <dsp:spPr>
+        <a:xfrm>
+          <a:off x="963" y="9241"/>
+          <a:ext cx="939831" cy="375932"/>
+        </a:xfrm>
+        <a:prstGeom prst="rect">
+          <a:avLst/>
+        </a:prstGeom>
+        <a:solidFill>
+          <a:schemeClr val="accent1">
+            <a:hueOff val="0"/>
+            <a:satOff val="0"/>
+            <a:lumOff val="0"/>
+            <a:alphaOff val="0"/>
+          </a:schemeClr>
+        </a:solidFill>
+        <a:ln w="15875" cap="flat" cmpd="sng" algn="ctr">
+          <a:solidFill>
+            <a:schemeClr val="accent1">
+              <a:hueOff val="0"/>
+              <a:satOff val="0"/>
+              <a:lumOff val="0"/>
+              <a:alphaOff val="0"/>
+            </a:schemeClr>
+          </a:solidFill>
+          <a:prstDash val="solid"/>
+        </a:ln>
+        <a:effectLst/>
+      </dsp:spPr>
+      <dsp:style>
+        <a:lnRef idx="2">
+          <a:scrgbClr r="0" g="0" b="0"/>
+        </a:lnRef>
+        <a:fillRef idx="1">
+          <a:scrgbClr r="0" g="0" b="0"/>
+        </a:fillRef>
+        <a:effectRef idx="0">
+          <a:scrgbClr r="0" g="0" b="0"/>
+        </a:effectRef>
+        <a:fontRef idx="minor">
+          <a:schemeClr val="lt1"/>
+        </a:fontRef>
+      </dsp:style>
+      <dsp:txBody>
+        <a:bodyPr spcFirstLastPara="0" vert="horz" wrap="square" lIns="85344" tIns="48768" rIns="85344" bIns="48768" numCol="1" spcCol="1270" anchor="ctr" anchorCtr="0">
+          <a:noAutofit/>
+        </a:bodyPr>
+        <a:lstStyle/>
+        <a:p>
+          <a:pPr lvl="0" algn="ctr" defTabSz="533400">
+            <a:lnSpc>
+              <a:spcPct val="90000"/>
+            </a:lnSpc>
+            <a:spcBef>
+              <a:spcPct val="0"/>
+            </a:spcBef>
+            <a:spcAft>
+              <a:spcPct val="35000"/>
+            </a:spcAft>
+          </a:pPr>
+          <a:r>
+            <a:rPr lang="en-US" sz="1200" kern="1200" dirty="0" smtClean="0"/>
+            <a:t>18/04/2005 09:30:00</a:t>
+          </a:r>
+          <a:endParaRPr lang="en-US" sz="1200" kern="1200" dirty="0"/>
+        </a:p>
+      </dsp:txBody>
+      <dsp:txXfrm>
+        <a:off x="963" y="9241"/>
+        <a:ext cx="939831" cy="375932"/>
+      </dsp:txXfrm>
+    </dsp:sp>
+    <dsp:sp modelId="{3D13FB4D-500D-459B-858B-B3F5F17C82D1}">
+      <dsp:nvSpPr>
+        <dsp:cNvPr id="0" name=""/>
+        <dsp:cNvSpPr/>
+      </dsp:nvSpPr>
+      <dsp:spPr>
+        <a:xfrm>
+          <a:off x="963" y="385174"/>
+          <a:ext cx="939831" cy="922320"/>
+        </a:xfrm>
+        <a:prstGeom prst="rect">
+          <a:avLst/>
+        </a:prstGeom>
+        <a:solidFill>
+          <a:schemeClr val="accent1">
+            <a:alpha val="90000"/>
+            <a:tint val="40000"/>
+            <a:hueOff val="0"/>
+            <a:satOff val="0"/>
+            <a:lumOff val="0"/>
+            <a:alphaOff val="0"/>
+          </a:schemeClr>
+        </a:solidFill>
+        <a:ln w="15875" cap="flat" cmpd="sng" algn="ctr">
+          <a:solidFill>
+            <a:schemeClr val="accent1">
+              <a:alpha val="90000"/>
+              <a:tint val="40000"/>
+              <a:hueOff val="0"/>
+              <a:satOff val="0"/>
+              <a:lumOff val="0"/>
+              <a:alphaOff val="0"/>
+            </a:schemeClr>
+          </a:solidFill>
+          <a:prstDash val="solid"/>
+        </a:ln>
+        <a:effectLst/>
+      </dsp:spPr>
+      <dsp:style>
+        <a:lnRef idx="2">
+          <a:scrgbClr r="0" g="0" b="0"/>
+        </a:lnRef>
+        <a:fillRef idx="1">
+          <a:scrgbClr r="0" g="0" b="0"/>
+        </a:fillRef>
+        <a:effectRef idx="0">
+          <a:scrgbClr r="0" g="0" b="0"/>
+        </a:effectRef>
+        <a:fontRef idx="minor"/>
+      </dsp:style>
+      <dsp:txBody>
+        <a:bodyPr spcFirstLastPara="0" vert="horz" wrap="square" lIns="64008" tIns="64008" rIns="85344" bIns="96012" numCol="1" spcCol="1270" anchor="t" anchorCtr="0">
+          <a:noAutofit/>
+        </a:bodyPr>
+        <a:lstStyle/>
+        <a:p>
+          <a:pPr marL="114300" lvl="1" indent="-114300" algn="l" defTabSz="533400">
+            <a:lnSpc>
+              <a:spcPct val="90000"/>
+            </a:lnSpc>
+            <a:spcBef>
+              <a:spcPct val="0"/>
+            </a:spcBef>
+            <a:spcAft>
+              <a:spcPct val="15000"/>
+            </a:spcAft>
+            <a:buChar char="••"/>
+          </a:pPr>
+          <a:r>
+            <a:rPr lang="en-US" sz="1200" kern="1200" dirty="0" smtClean="0"/>
+            <a:t>E: 107	R: 2</a:t>
+          </a:r>
+          <a:endParaRPr lang="en-US" sz="1200" kern="1200" dirty="0"/>
+        </a:p>
+        <a:p>
+          <a:pPr marL="114300" lvl="1" indent="-114300" algn="l" defTabSz="533400">
+            <a:lnSpc>
+              <a:spcPct val="90000"/>
+            </a:lnSpc>
+            <a:spcBef>
+              <a:spcPct val="0"/>
+            </a:spcBef>
+            <a:spcAft>
+              <a:spcPct val="15000"/>
+            </a:spcAft>
+            <a:buChar char="••"/>
+          </a:pPr>
+          <a:r>
+            <a:rPr lang="en-US" sz="1200" kern="1200" dirty="0" smtClean="0"/>
+            <a:t>E: 202	R: 1</a:t>
+          </a:r>
+          <a:endParaRPr lang="en-US" sz="1200" kern="1200" dirty="0"/>
+        </a:p>
+      </dsp:txBody>
+      <dsp:txXfrm>
+        <a:off x="963" y="385174"/>
+        <a:ext cx="939831" cy="922320"/>
+      </dsp:txXfrm>
+    </dsp:sp>
+    <dsp:sp modelId="{6EB323F8-069A-4F16-B0D7-3F62ED9C1774}">
+      <dsp:nvSpPr>
+        <dsp:cNvPr id="0" name=""/>
+        <dsp:cNvSpPr/>
+      </dsp:nvSpPr>
+      <dsp:spPr>
+        <a:xfrm>
+          <a:off x="1072372" y="9241"/>
+          <a:ext cx="939831" cy="375932"/>
+        </a:xfrm>
+        <a:prstGeom prst="rect">
+          <a:avLst/>
+        </a:prstGeom>
+        <a:solidFill>
+          <a:schemeClr val="accent1">
+            <a:hueOff val="0"/>
+            <a:satOff val="0"/>
+            <a:lumOff val="0"/>
+            <a:alphaOff val="0"/>
+          </a:schemeClr>
+        </a:solidFill>
+        <a:ln w="15875" cap="flat" cmpd="sng" algn="ctr">
+          <a:solidFill>
+            <a:schemeClr val="accent1">
+              <a:hueOff val="0"/>
+              <a:satOff val="0"/>
+              <a:lumOff val="0"/>
+              <a:alphaOff val="0"/>
+            </a:schemeClr>
+          </a:solidFill>
+          <a:prstDash val="solid"/>
+        </a:ln>
+        <a:effectLst/>
+      </dsp:spPr>
+      <dsp:style>
+        <a:lnRef idx="2">
+          <a:scrgbClr r="0" g="0" b="0"/>
+        </a:lnRef>
+        <a:fillRef idx="1">
+          <a:scrgbClr r="0" g="0" b="0"/>
+        </a:fillRef>
+        <a:effectRef idx="0">
+          <a:scrgbClr r="0" g="0" b="0"/>
+        </a:effectRef>
+        <a:fontRef idx="minor">
+          <a:schemeClr val="lt1"/>
+        </a:fontRef>
+      </dsp:style>
+      <dsp:txBody>
+        <a:bodyPr spcFirstLastPara="0" vert="horz" wrap="square" lIns="85344" tIns="48768" rIns="85344" bIns="48768" numCol="1" spcCol="1270" anchor="ctr" anchorCtr="0">
+          <a:noAutofit/>
+        </a:bodyPr>
+        <a:lstStyle/>
+        <a:p>
+          <a:pPr lvl="0" algn="ctr" defTabSz="533400">
+            <a:lnSpc>
+              <a:spcPct val="90000"/>
+            </a:lnSpc>
+            <a:spcBef>
+              <a:spcPct val="0"/>
+            </a:spcBef>
+            <a:spcAft>
+              <a:spcPct val="35000"/>
+            </a:spcAft>
+          </a:pPr>
+          <a:r>
+            <a:rPr lang="en-US" sz="1200" kern="1200" dirty="0" smtClean="0"/>
+            <a:t>19/04/2005 09:30:00</a:t>
+          </a:r>
+          <a:endParaRPr lang="en-US" sz="1200" kern="1200" dirty="0"/>
+        </a:p>
+      </dsp:txBody>
+      <dsp:txXfrm>
+        <a:off x="1072372" y="9241"/>
+        <a:ext cx="939831" cy="375932"/>
+      </dsp:txXfrm>
+    </dsp:sp>
+    <dsp:sp modelId="{E6C2ED4F-3122-4690-8C3D-E9FBEA807E7C}">
+      <dsp:nvSpPr>
+        <dsp:cNvPr id="0" name=""/>
+        <dsp:cNvSpPr/>
+      </dsp:nvSpPr>
+      <dsp:spPr>
+        <a:xfrm>
+          <a:off x="1072372" y="385174"/>
+          <a:ext cx="939831" cy="922320"/>
+        </a:xfrm>
+        <a:prstGeom prst="rect">
+          <a:avLst/>
+        </a:prstGeom>
+        <a:solidFill>
+          <a:schemeClr val="accent1">
+            <a:alpha val="90000"/>
+            <a:tint val="40000"/>
+            <a:hueOff val="0"/>
+            <a:satOff val="0"/>
+            <a:lumOff val="0"/>
+            <a:alphaOff val="0"/>
+          </a:schemeClr>
+        </a:solidFill>
+        <a:ln w="15875" cap="flat" cmpd="sng" algn="ctr">
+          <a:solidFill>
+            <a:schemeClr val="accent1">
+              <a:alpha val="90000"/>
+              <a:tint val="40000"/>
+              <a:hueOff val="0"/>
+              <a:satOff val="0"/>
+              <a:lumOff val="0"/>
+              <a:alphaOff val="0"/>
+            </a:schemeClr>
+          </a:solidFill>
+          <a:prstDash val="solid"/>
+        </a:ln>
+        <a:effectLst/>
+      </dsp:spPr>
+      <dsp:style>
+        <a:lnRef idx="2">
+          <a:scrgbClr r="0" g="0" b="0"/>
+        </a:lnRef>
+        <a:fillRef idx="1">
+          <a:scrgbClr r="0" g="0" b="0"/>
+        </a:fillRef>
+        <a:effectRef idx="0">
+          <a:scrgbClr r="0" g="0" b="0"/>
+        </a:effectRef>
+        <a:fontRef idx="minor"/>
+      </dsp:style>
+      <dsp:txBody>
+        <a:bodyPr spcFirstLastPara="0" vert="horz" wrap="square" lIns="64008" tIns="64008" rIns="85344" bIns="96012" numCol="1" spcCol="1270" anchor="t" anchorCtr="0">
+          <a:noAutofit/>
+        </a:bodyPr>
+        <a:lstStyle/>
+        <a:p>
+          <a:pPr marL="114300" lvl="1" indent="-114300" algn="l" defTabSz="533400">
+            <a:lnSpc>
+              <a:spcPct val="90000"/>
+            </a:lnSpc>
+            <a:spcBef>
+              <a:spcPct val="0"/>
+            </a:spcBef>
+            <a:spcAft>
+              <a:spcPct val="15000"/>
+            </a:spcAft>
+            <a:buChar char="••"/>
+          </a:pPr>
+          <a:r>
+            <a:rPr lang="en-US" sz="1200" kern="1200" dirty="0" smtClean="0"/>
+            <a:t>E: 2	R: 5</a:t>
+          </a:r>
+          <a:endParaRPr lang="en-US" sz="1200" kern="1200" dirty="0"/>
+        </a:p>
+      </dsp:txBody>
+      <dsp:txXfrm>
+        <a:off x="1072372" y="385174"/>
+        <a:ext cx="939831" cy="922320"/>
+      </dsp:txXfrm>
+    </dsp:sp>
+    <dsp:sp modelId="{ED0C6729-1393-4353-B252-FF075B28E681}">
+      <dsp:nvSpPr>
+        <dsp:cNvPr id="0" name=""/>
+        <dsp:cNvSpPr/>
+      </dsp:nvSpPr>
+      <dsp:spPr>
+        <a:xfrm>
+          <a:off x="2143780" y="9241"/>
+          <a:ext cx="939831" cy="375932"/>
+        </a:xfrm>
+        <a:prstGeom prst="rect">
+          <a:avLst/>
+        </a:prstGeom>
+        <a:solidFill>
+          <a:schemeClr val="accent1">
+            <a:hueOff val="0"/>
+            <a:satOff val="0"/>
+            <a:lumOff val="0"/>
+            <a:alphaOff val="0"/>
+          </a:schemeClr>
+        </a:solidFill>
+        <a:ln w="15875" cap="flat" cmpd="sng" algn="ctr">
+          <a:solidFill>
+            <a:schemeClr val="accent1">
+              <a:hueOff val="0"/>
+              <a:satOff val="0"/>
+              <a:lumOff val="0"/>
+              <a:alphaOff val="0"/>
+            </a:schemeClr>
+          </a:solidFill>
+          <a:prstDash val="solid"/>
+        </a:ln>
+        <a:effectLst/>
+      </dsp:spPr>
+      <dsp:style>
+        <a:lnRef idx="2">
+          <a:scrgbClr r="0" g="0" b="0"/>
+        </a:lnRef>
+        <a:fillRef idx="1">
+          <a:scrgbClr r="0" g="0" b="0"/>
+        </a:fillRef>
+        <a:effectRef idx="0">
+          <a:scrgbClr r="0" g="0" b="0"/>
+        </a:effectRef>
+        <a:fontRef idx="minor">
+          <a:schemeClr val="lt1"/>
+        </a:fontRef>
+      </dsp:style>
+      <dsp:txBody>
+        <a:bodyPr spcFirstLastPara="0" vert="horz" wrap="square" lIns="85344" tIns="48768" rIns="85344" bIns="48768" numCol="1" spcCol="1270" anchor="ctr" anchorCtr="0">
+          <a:noAutofit/>
+        </a:bodyPr>
+        <a:lstStyle/>
+        <a:p>
+          <a:pPr lvl="0" algn="ctr" defTabSz="533400">
+            <a:lnSpc>
+              <a:spcPct val="90000"/>
+            </a:lnSpc>
+            <a:spcBef>
+              <a:spcPct val="0"/>
+            </a:spcBef>
+            <a:spcAft>
+              <a:spcPct val="35000"/>
+            </a:spcAft>
+          </a:pPr>
+          <a:r>
+            <a:rPr lang="en-US" sz="1200" kern="1200" dirty="0" smtClean="0"/>
+            <a:t>20/04/2005 09:30:00</a:t>
+          </a:r>
+          <a:endParaRPr lang="en-US" sz="1200" kern="1200" dirty="0"/>
+        </a:p>
+      </dsp:txBody>
+      <dsp:txXfrm>
+        <a:off x="2143780" y="9241"/>
+        <a:ext cx="939831" cy="375932"/>
+      </dsp:txXfrm>
+    </dsp:sp>
+    <dsp:sp modelId="{C2621C42-605E-40B9-B96E-0AEDD830E23B}">
+      <dsp:nvSpPr>
+        <dsp:cNvPr id="0" name=""/>
+        <dsp:cNvSpPr/>
+      </dsp:nvSpPr>
+      <dsp:spPr>
+        <a:xfrm>
+          <a:off x="2143780" y="385174"/>
+          <a:ext cx="939831" cy="922320"/>
+        </a:xfrm>
+        <a:prstGeom prst="rect">
+          <a:avLst/>
+        </a:prstGeom>
+        <a:solidFill>
+          <a:schemeClr val="accent1">
+            <a:alpha val="90000"/>
+            <a:tint val="40000"/>
+            <a:hueOff val="0"/>
+            <a:satOff val="0"/>
+            <a:lumOff val="0"/>
+            <a:alphaOff val="0"/>
+          </a:schemeClr>
+        </a:solidFill>
+        <a:ln w="15875" cap="flat" cmpd="sng" algn="ctr">
+          <a:solidFill>
+            <a:schemeClr val="accent1">
+              <a:alpha val="90000"/>
+              <a:tint val="40000"/>
+              <a:hueOff val="0"/>
+              <a:satOff val="0"/>
+              <a:lumOff val="0"/>
+              <a:alphaOff val="0"/>
+            </a:schemeClr>
+          </a:solidFill>
+          <a:prstDash val="solid"/>
+        </a:ln>
+        <a:effectLst/>
+      </dsp:spPr>
+      <dsp:style>
+        <a:lnRef idx="2">
+          <a:scrgbClr r="0" g="0" b="0"/>
+        </a:lnRef>
+        <a:fillRef idx="1">
+          <a:scrgbClr r="0" g="0" b="0"/>
+        </a:fillRef>
+        <a:effectRef idx="0">
+          <a:scrgbClr r="0" g="0" b="0"/>
+        </a:effectRef>
+        <a:fontRef idx="minor"/>
+      </dsp:style>
+      <dsp:txBody>
+        <a:bodyPr spcFirstLastPara="0" vert="horz" wrap="square" lIns="64008" tIns="64008" rIns="85344" bIns="96012" numCol="1" spcCol="1270" anchor="t" anchorCtr="0">
+          <a:noAutofit/>
+        </a:bodyPr>
+        <a:lstStyle/>
+        <a:p>
+          <a:pPr marL="114300" lvl="1" indent="-114300" algn="l" defTabSz="533400">
+            <a:lnSpc>
+              <a:spcPct val="90000"/>
+            </a:lnSpc>
+            <a:spcBef>
+              <a:spcPct val="0"/>
+            </a:spcBef>
+            <a:spcAft>
+              <a:spcPct val="15000"/>
+            </a:spcAft>
+            <a:buChar char="••"/>
+          </a:pPr>
+          <a:r>
+            <a:rPr lang="en-US" sz="1200" kern="1200" dirty="0" smtClean="0"/>
+            <a:t>E: 112	R: 6</a:t>
+          </a:r>
+          <a:endParaRPr lang="en-US" sz="1200" kern="1200" dirty="0"/>
+        </a:p>
+        <a:p>
+          <a:pPr marL="114300" lvl="1" indent="-114300" algn="l" defTabSz="533400">
+            <a:lnSpc>
+              <a:spcPct val="90000"/>
+            </a:lnSpc>
+            <a:spcBef>
+              <a:spcPct val="0"/>
+            </a:spcBef>
+            <a:spcAft>
+              <a:spcPct val="15000"/>
+            </a:spcAft>
+            <a:buChar char="••"/>
+          </a:pPr>
+          <a:r>
+            <a:rPr lang="en-US" sz="1200" kern="1200" dirty="0" smtClean="0"/>
+            <a:t>E: 254	R: 1</a:t>
+          </a:r>
+          <a:endParaRPr lang="en-US" sz="1200" kern="1200" dirty="0"/>
+        </a:p>
+      </dsp:txBody>
+      <dsp:txXfrm>
+        <a:off x="2143780" y="385174"/>
+        <a:ext cx="939831" cy="922320"/>
+      </dsp:txXfrm>
+    </dsp:sp>
   </dsp:spTree>
 </dsp:drawing>
 </file>
@@ -17259,23 +18686,7 @@
                   <a:srgbClr val="404040"/>
                 </a:solidFill>
               </a:rPr>
-              <a:t>Modifications to the </a:t>
-            </a:r>
-            <a:r>
-              <a:rPr lang="en-US" sz="2800" dirty="0" smtClean="0">
-                <a:solidFill>
-                  <a:srgbClr val="404040"/>
-                </a:solidFill>
-              </a:rPr>
-              <a:t>operators </a:t>
-            </a:r>
-            <a:r>
-              <a:rPr lang="en-US" sz="2800" dirty="0" smtClean="0">
-                <a:solidFill>
-                  <a:srgbClr val="404040"/>
-                </a:solidFill>
-              </a:rPr>
-              <a:t>to move two examinations at the same time</a:t>
+              <a:t>Modifications to the operators to move two examinations at the same time</a:t>
             </a:r>
             <a:endParaRPr lang="en-US" sz="2800" dirty="0">
               <a:solidFill>
@@ -18159,7 +19570,7 @@
 </file>
 
 <file path=ppt/slides/slide5.xml><?xml version="1.0" encoding="utf-8"?>
-<p:sld xmlns:a="http://schemas.openxmlformats.org/drawingml/2006/main" xmlns:r="http://schemas.openxmlformats.org/officeDocument/2006/relationships" xmlns:p="http://schemas.openxmlformats.org/presentationml/2006/main">
+<p:sld xmlns:a="http://schemas.openxmlformats.org/drawingml/2006/main" xmlns:r="http://schemas.openxmlformats.org/officeDocument/2006/relationships" xmlns:p="http://schemas.openxmlformats.org/presentationml/2006/main" show="0">
   <p:cSld>
     <p:spTree>
       <p:nvGrpSpPr>
@@ -18421,11 +19832,11 @@
   <p:clrMapOvr>
     <a:masterClrMapping/>
   </p:clrMapOvr>
-  <mc:AlternateContent xmlns:mc="http://schemas.openxmlformats.org/markup-compatibility/2006" xmlns:p14="http://schemas.microsoft.com/office/powerpoint/2010/main">
-    <mc:Choice Requires="p14">
+  <mc:AlternateContent xmlns:mc="http://schemas.openxmlformats.org/markup-compatibility/2006">
+    <mc:Choice xmlns:p14="http://schemas.microsoft.com/office/powerpoint/2010/main" Requires="p14">
       <p:transition spd="slow" p14:dur="2000"/>
     </mc:Choice>
-    <mc:Fallback xmlns="">
+    <mc:Fallback>
       <p:transition spd="slow"/>
     </mc:Fallback>
   </mc:AlternateContent>
@@ -19013,7 +20424,7 @@
 </file>
 
 <file path=ppt/slides/slide8.xml><?xml version="1.0" encoding="utf-8"?>
-<p:sld xmlns:a="http://schemas.openxmlformats.org/drawingml/2006/main" xmlns:r="http://schemas.openxmlformats.org/officeDocument/2006/relationships" xmlns:p="http://schemas.openxmlformats.org/presentationml/2006/main">
+<p:sld xmlns:a="http://schemas.openxmlformats.org/drawingml/2006/main" xmlns:r="http://schemas.openxmlformats.org/officeDocument/2006/relationships" xmlns:p="http://schemas.openxmlformats.org/presentationml/2006/main" show="0">
   <p:cSld>
     <p:spTree>
       <p:nvGrpSpPr>
@@ -19880,6 +21291,14 @@
   <p:clrMapOvr>
     <a:masterClrMapping/>
   </p:clrMapOvr>
+  <mc:AlternateContent xmlns:mc="http://schemas.openxmlformats.org/markup-compatibility/2006">
+    <mc:Choice xmlns:p14="http://schemas.microsoft.com/office/powerpoint/2010/main" Requires="p14">
+      <p:transition spd="slow" p14:dur="2000"/>
+    </mc:Choice>
+    <mc:Fallback>
+      <p:transition spd="slow"/>
+    </mc:Fallback>
+  </mc:AlternateContent>
   <p:timing>
     <p:tnLst>
       <p:par>

</xml_diff>